<commit_message>
docs: actualización de la presentación
</commit_message>
<xml_diff>
--- a/01-Análisis/01-Componente metodológico/Grupo4LittoNet.pptx
+++ b/01-Análisis/01-Componente metodológico/Grupo4LittoNet.pptx
@@ -300,7 +300,7 @@
           <a:p>
             <a:fld id="{B3030C24-9424-B24A-8613-79990C3AA492}" type="datetimeFigureOut">
               <a:rPr lang="es-ES" smtClean="0"/>
-              <a:t>28/09/2020</a:t>
+              <a:t>09/10/2020</a:t>
             </a:fld>
             <a:endParaRPr lang="es-ES"/>
           </a:p>
@@ -480,7 +480,7 @@
           <a:p>
             <a:fld id="{B3030C24-9424-B24A-8613-79990C3AA492}" type="datetimeFigureOut">
               <a:rPr lang="es-ES" smtClean="0"/>
-              <a:t>28/09/2020</a:t>
+              <a:t>09/10/2020</a:t>
             </a:fld>
             <a:endParaRPr lang="es-ES"/>
           </a:p>
@@ -1116,7 +1116,7 @@
           <a:p>
             <a:fld id="{B3030C24-9424-B24A-8613-79990C3AA492}" type="datetimeFigureOut">
               <a:rPr lang="es-ES" smtClean="0"/>
-              <a:t>28/09/2020</a:t>
+              <a:t>09/10/2020</a:t>
             </a:fld>
             <a:endParaRPr lang="es-ES"/>
           </a:p>
@@ -1369,7 +1369,7 @@
           <a:p>
             <a:fld id="{B3030C24-9424-B24A-8613-79990C3AA492}" type="datetimeFigureOut">
               <a:rPr lang="es-ES" smtClean="0"/>
-              <a:t>28/09/2020</a:t>
+              <a:t>09/10/2020</a:t>
             </a:fld>
             <a:endParaRPr lang="es-ES"/>
           </a:p>
@@ -1582,7 +1582,7 @@
           <a:p>
             <a:fld id="{B3030C24-9424-B24A-8613-79990C3AA492}" type="datetimeFigureOut">
               <a:rPr lang="es-ES" smtClean="0"/>
-              <a:t>28/09/2020</a:t>
+              <a:t>09/10/2020</a:t>
             </a:fld>
             <a:endParaRPr lang="es-ES"/>
           </a:p>
@@ -1966,7 +1966,7 @@
         <p:spPr>
           <a:xfrm>
             <a:off x="646043" y="1894152"/>
-            <a:ext cx="7613374" cy="1200329"/>
+            <a:ext cx="7613374" cy="1569660"/>
           </a:xfrm>
           <a:prstGeom prst="rect">
             <a:avLst/>
@@ -1985,7 +1985,7 @@
                 <a:latin typeface="+mj-lt"/>
                 <a:ea typeface="Batang" panose="02030600000101010101" pitchFamily="18" charset="-127"/>
               </a:rPr>
-              <a:t>Sistema de información para el mejoramiento y promoción del servicio que ofrece la litografía Gestaltex, ubicada en el barrio La Estrada en la ciudad de Bogotá.</a:t>
+              <a:t>Sistema de información para el mejoramiento y promoción del servicio de tarjetería para eventos que ofrece la litografía Gestaltex, ubicada en el barrio La Estrada en la ciudad de Bogotá.</a:t>
             </a:r>
             <a:endParaRPr lang="es-ES" sz="2400" b="1" dirty="0">
               <a:latin typeface="+mj-lt"/>
@@ -2376,7 +2376,7 @@
         <p:spPr>
           <a:xfrm>
             <a:off x="839857" y="2142892"/>
-            <a:ext cx="3732144" cy="1754326"/>
+            <a:ext cx="3732144" cy="2031325"/>
           </a:xfrm>
           <a:prstGeom prst="rect">
             <a:avLst/>
@@ -2394,7 +2394,7 @@
             </a:pPr>
             <a:r>
               <a:rPr lang="es-CO" dirty="0"/>
-              <a:t>Desarrollar un sistema de información para mejorar y promocionar el servicio que ofrece la litografía Gestaltex, ubicada en el barrio La Estrada, en la ciudad de Bogotá.</a:t>
+              <a:t>Desarrollar un sistema de información para mejorar y promocionar el servicio de tarjetería para eventos que ofrece la litografía Gestaltex, ubicada en el barrio La Estrada, en la ciudad de Bogotá.</a:t>
             </a:r>
             <a:endParaRPr lang="es-ES" dirty="0"/>
           </a:p>
@@ -2513,7 +2513,7 @@
         <p:spPr>
           <a:xfrm>
             <a:off x="436132" y="1224501"/>
-            <a:ext cx="8271736" cy="3816429"/>
+            <a:ext cx="8271736" cy="3693319"/>
           </a:xfrm>
           <a:prstGeom prst="rect">
             <a:avLst/>
@@ -2531,10 +2531,10 @@
               <a:buChar char="•"/>
             </a:pPr>
             <a:r>
-              <a:rPr lang="es-CO" sz="1600" dirty="0"/>
+              <a:rPr lang="es-CO" dirty="0"/>
               <a:t>Definir dentro de los servicios de la litografía Gestaltex, el diseño de tarjetas de invitación como referencia para el desarrollo del sistema de información. </a:t>
             </a:r>
-            <a:endParaRPr lang="es-ES" sz="1600" dirty="0"/>
+            <a:endParaRPr lang="es-ES" dirty="0"/>
           </a:p>
           <a:p>
             <a:pPr marL="285750" indent="-285750" algn="just">
@@ -2542,7 +2542,7 @@
               <a:buChar char="•"/>
             </a:pPr>
             <a:r>
-              <a:rPr lang="es-CO" sz="1600" dirty="0"/>
+              <a:rPr lang="es-CO" dirty="0"/>
               <a:t>Definir los requerimientos y la estructura del sistema de información.</a:t>
             </a:r>
           </a:p>
@@ -2552,7 +2552,7 @@
               <a:buChar char="•"/>
             </a:pPr>
             <a:r>
-              <a:rPr lang="es-CO" sz="1600" dirty="0"/>
+              <a:rPr lang="es-CO" dirty="0"/>
               <a:t>Planificar el cronograma para el cumplimiento de actividades que conduzcan al desarrollo del sistema de información.</a:t>
             </a:r>
           </a:p>
@@ -2562,7 +2562,7 @@
               <a:buChar char="•"/>
             </a:pPr>
             <a:r>
-              <a:rPr lang="es-CO" sz="1600" dirty="0"/>
+              <a:rPr lang="es-CO" dirty="0"/>
               <a:t>Manejar el desarrollo del sistema de información por medio de un repositorio que incluya información sobre la presentación y el contenido del mismo.</a:t>
             </a:r>
           </a:p>
@@ -2572,8 +2572,8 @@
               <a:buChar char="•"/>
             </a:pPr>
             <a:r>
-              <a:rPr lang="es-CO" sz="1600" dirty="0"/>
-              <a:t>Distribuir las tareas a través del repositorio en ramas para cada integrante según los requerimientos del proyecto.</a:t>
+              <a:rPr lang="es-CO" dirty="0"/>
+              <a:t>Diseñar un algoritmo que permita al cliente personalizar  tarjetas de invitación. </a:t>
             </a:r>
           </a:p>
           <a:p>
@@ -2582,8 +2582,8 @@
               <a:buChar char="•"/>
             </a:pPr>
             <a:r>
-              <a:rPr lang="es-CO" sz="1600" dirty="0"/>
-              <a:t>Diseñar un algoritmo que permita al cliente personalizar  tarjetas de invitación. </a:t>
+              <a:rPr lang="es-CO" dirty="0"/>
+              <a:t>Gestionar la interfaz para la visualización del catálogo de productos y la personalización de las tarjetas de invitación.</a:t>
             </a:r>
           </a:p>
           <a:p>
@@ -2592,8 +2592,8 @@
               <a:buChar char="•"/>
             </a:pPr>
             <a:r>
-              <a:rPr lang="es-CO" sz="1600" dirty="0"/>
-              <a:t>Gestionar la interfaz y las opciones de diseño  para la venta online y la distribución de las tarjetas personalizadas.</a:t>
+              <a:rPr lang="es-CO" dirty="0"/>
+              <a:t>Gestionar usuarios mediante una base de datos y formularios de registro.</a:t>
             </a:r>
           </a:p>
           <a:p>
@@ -2602,20 +2602,10 @@
               <a:buChar char="•"/>
             </a:pPr>
             <a:r>
-              <a:rPr lang="es-CO" sz="1600" dirty="0"/>
-              <a:t>Gestionar usuarios mediante una base de datos y formularios de registro.</a:t>
-            </a:r>
-          </a:p>
-          <a:p>
-            <a:pPr marL="285750" indent="-285750" algn="just">
-              <a:buFont typeface="Arial" panose="020B0604020202020204" pitchFamily="34" charset="0"/>
-              <a:buChar char="•"/>
-            </a:pPr>
-            <a:r>
-              <a:rPr lang="es-CO" sz="1600" dirty="0"/>
+              <a:rPr lang="es-CO" dirty="0"/>
               <a:t>Generar facturas y cotizaciones para la organización de las compras del producto.</a:t>
             </a:r>
-            <a:endParaRPr lang="es-CO" dirty="0"/>
+            <a:endParaRPr lang="es-CO" sz="2000" dirty="0"/>
           </a:p>
           <a:p>
             <a:endParaRPr lang="es-ES" dirty="0"/>

</xml_diff>